<commit_message>
added comments up until BRANCHES...then skimmed and left some comments after that. i think it would be nice to use a chef/kitchen analogy. also, it would be good to have an index of terms and their analogies early on
</commit_message>
<xml_diff>
--- a/GitForHumans.pptx
+++ b/GitForHumans.pptx
@@ -316,7 +316,7 @@
       </p:ext>
     </p:extLst>
   </p:cmAuthor>
-  <p:cmAuthor id="2" name="Megan Lee" initials="ML" lastIdx="8" clrIdx="1">
+  <p:cmAuthor id="2" name="Megan Lee" initials="ML" lastIdx="49" clrIdx="1">
     <p:extLst>
       <p:ext uri="{19B8F6BF-5375-455C-9EA6-DF929625EA0E}">
         <p15:presenceInfo xmlns:p15="http://schemas.microsoft.com/office/powerpoint/2012/main" userId="9a036394966f8749" providerId="Windows Live"/>
@@ -340,7 +340,343 @@
 </p:cmLst>
 </file>
 
+<file path=ppt/comments/comment10.xml><?xml version="1.0" encoding="utf-8"?>
+<p:cmLst xmlns:a="http://schemas.openxmlformats.org/drawingml/2006/main" xmlns:r="http://schemas.openxmlformats.org/officeDocument/2006/relationships" xmlns:p="http://schemas.openxmlformats.org/presentationml/2006/main">
+  <p:cm authorId="2" dt="2019-01-20T23:04:50.923" idx="22">
+    <p:pos x="2410" y="1030"/>
+    <p:text>your computer, where you have YOUR local copy of the thing you're working on.</p:text>
+    <p:extLst>
+      <p:ext uri="{C676402C-5697-4E1C-873F-D02D1690AC5C}">
+        <p15:threadingInfo xmlns:p15="http://schemas.microsoft.com/office/powerpoint/2012/main" timeZoneBias="480"/>
+      </p:ext>
+    </p:extLst>
+  </p:cm>
+  <p:cm authorId="2" dt="2019-01-20T23:05:16.894" idx="23">
+    <p:pos x="3810" y="1012"/>
+    <p:text>your staging area: what you decide to put up as changes to the existing branch (NOT yet submitted)</p:text>
+    <p:extLst>
+      <p:ext uri="{C676402C-5697-4E1C-873F-D02D1690AC5C}">
+        <p15:threadingInfo xmlns:p15="http://schemas.microsoft.com/office/powerpoint/2012/main" timeZoneBias="480"/>
+      </p:ext>
+    </p:extLst>
+  </p:cm>
+  <p:cm authorId="2" dt="2019-01-20T23:05:56.717" idx="24">
+    <p:pos x="5410" y="1006"/>
+    <p:text>Your "U ARE HERE" sticker</p:text>
+    <p:extLst>
+      <p:ext uri="{C676402C-5697-4E1C-873F-D02D1690AC5C}">
+        <p15:threadingInfo xmlns:p15="http://schemas.microsoft.com/office/powerpoint/2012/main" timeZoneBias="480"/>
+      </p:ext>
+    </p:extLst>
+  </p:cm>
+  <p:cm authorId="2" dt="2019-01-20T23:06:30.693" idx="25">
+    <p:pos x="5410" y="1102"/>
+    <p:text>this image can actually be misleading, since HEAD varies depending on what step is being done first</p:text>
+    <p:extLst>
+      <p:ext uri="{C676402C-5697-4E1C-873F-D02D1690AC5C}">
+        <p15:threadingInfo xmlns:p15="http://schemas.microsoft.com/office/powerpoint/2012/main" timeZoneBias="480">
+          <p15:parentCm authorId="2" idx="24"/>
+        </p15:threadingInfo>
+      </p:ext>
+    </p:extLst>
+  </p:cm>
+  <p:cm authorId="2" dt="2019-01-20T23:06:38.405" idx="26">
+    <p:pos x="2890" y="2662"/>
+    <p:text>ie, git add HelloWorld.java</p:text>
+    <p:extLst>
+      <p:ext uri="{C676402C-5697-4E1C-873F-D02D1690AC5C}">
+        <p15:threadingInfo xmlns:p15="http://schemas.microsoft.com/office/powerpoint/2012/main" timeZoneBias="480"/>
+      </p:ext>
+    </p:extLst>
+  </p:cm>
+  <p:cm authorId="2" dt="2019-01-20T23:07:47.698" idx="27">
+    <p:pos x="2890" y="2758"/>
+    <p:text>this picture is again confusing. the next action is git commit, which puts the staged files in the index.</p:text>
+    <p:extLst>
+      <p:ext uri="{C676402C-5697-4E1C-873F-D02D1690AC5C}">
+        <p15:threadingInfo xmlns:p15="http://schemas.microsoft.com/office/powerpoint/2012/main" timeZoneBias="480">
+          <p15:parentCm authorId="2" idx="26"/>
+        </p15:threadingInfo>
+      </p:ext>
+    </p:extLst>
+  </p:cm>
+  <p:cm authorId="2" dt="2019-01-20T23:08:28.856" idx="29">
+    <p:pos x="2890" y="2854"/>
+    <p:text>also would want to annotate how to include the commit comments.</p:text>
+    <p:extLst>
+      <p:ext uri="{C676402C-5697-4E1C-873F-D02D1690AC5C}">
+        <p15:threadingInfo xmlns:p15="http://schemas.microsoft.com/office/powerpoint/2012/main" timeZoneBias="480">
+          <p15:parentCm authorId="2" idx="26"/>
+        </p15:threadingInfo>
+      </p:ext>
+    </p:extLst>
+  </p:cm>
+  <p:cm authorId="2" dt="2019-01-20T23:07:50.698" idx="28">
+    <p:pos x="5050" y="2794"/>
+    <p:text>after git push, THEN your version was 'pushed' to the remote branch, and then your HEAD sticker/label is updated with your new location, relative to the remote branch</p:text>
+    <p:extLst>
+      <p:ext uri="{C676402C-5697-4E1C-873F-D02D1690AC5C}">
+        <p15:threadingInfo xmlns:p15="http://schemas.microsoft.com/office/powerpoint/2012/main" timeZoneBias="480"/>
+      </p:ext>
+    </p:extLst>
+  </p:cm>
+</p:cmLst>
+</file>
+
+<file path=ppt/comments/comment11.xml><?xml version="1.0" encoding="utf-8"?>
+<p:cmLst xmlns:a="http://schemas.openxmlformats.org/drawingml/2006/main" xmlns:r="http://schemas.openxmlformats.org/officeDocument/2006/relationships" xmlns:p="http://schemas.openxmlformats.org/presentationml/2006/main">
+  <p:cm authorId="2" dt="2019-01-20T23:09:30.351" idx="30">
+    <p:pos x="4164" y="3132"/>
+    <p:text>really important to note that the idea of CHECKOUT to a real human being is like 'checking out a book at the library'.</p:text>
+    <p:extLst>
+      <p:ext uri="{C676402C-5697-4E1C-873F-D02D1690AC5C}">
+        <p15:threadingInfo xmlns:p15="http://schemas.microsoft.com/office/powerpoint/2012/main" timeZoneBias="480"/>
+      </p:ext>
+    </p:extLst>
+  </p:cm>
+  <p:cm authorId="2" dt="2019-01-20T23:11:12.520" idx="31">
+    <p:pos x="4164" y="3228"/>
+    <p:text>what really could be described is "please, may i go to a previous version of this book and look at/modify that version". for example if jane austen comes in different editions, 'git checkout hexID' would be like going back and resetting your position on the tree to the old edition</p:text>
+    <p:extLst>
+      <p:ext uri="{C676402C-5697-4E1C-873F-D02D1690AC5C}">
+        <p15:threadingInfo xmlns:p15="http://schemas.microsoft.com/office/powerpoint/2012/main" timeZoneBias="480">
+          <p15:parentCm authorId="2" idx="30"/>
+        </p15:threadingInfo>
+      </p:ext>
+    </p:extLst>
+  </p:cm>
+  <p:cm authorId="2" dt="2019-01-20T23:11:20.429" idx="32">
+    <p:pos x="4236" y="3648"/>
+    <p:text>however many will make it unique for Git to determine what matches</p:text>
+    <p:extLst>
+      <p:ext uri="{C676402C-5697-4E1C-873F-D02D1690AC5C}">
+        <p15:threadingInfo xmlns:p15="http://schemas.microsoft.com/office/powerpoint/2012/main" timeZoneBias="480"/>
+      </p:ext>
+    </p:extLst>
+  </p:cm>
+</p:cmLst>
+</file>
+
+<file path=ppt/comments/comment12.xml><?xml version="1.0" encoding="utf-8"?>
+<p:cmLst xmlns:a="http://schemas.openxmlformats.org/drawingml/2006/main" xmlns:r="http://schemas.openxmlformats.org/officeDocument/2006/relationships" xmlns:p="http://schemas.openxmlformats.org/presentationml/2006/main">
+  <p:cm authorId="2" dt="2019-01-20T23:11:57.462" idx="33">
+    <p:pos x="7032" y="936"/>
+    <p:text>to be clear: this actually doesn't PULL that version</p:text>
+    <p:extLst>
+      <p:ext uri="{C676402C-5697-4E1C-873F-D02D1690AC5C}">
+        <p15:threadingInfo xmlns:p15="http://schemas.microsoft.com/office/powerpoint/2012/main" timeZoneBias="480"/>
+      </p:ext>
+    </p:extLst>
+  </p:cm>
+  <p:cm authorId="2" dt="2019-01-20T23:12:18.478" idx="34">
+    <p:pos x="7032" y="1032"/>
+    <p:text>PULLING is getting the version copy</p:text>
+    <p:extLst>
+      <p:ext uri="{C676402C-5697-4E1C-873F-D02D1690AC5C}">
+        <p15:threadingInfo xmlns:p15="http://schemas.microsoft.com/office/powerpoint/2012/main" timeZoneBias="480">
+          <p15:parentCm authorId="2" idx="33"/>
+        </p15:threadingInfo>
+      </p:ext>
+    </p:extLst>
+  </p:cm>
+  <p:cm authorId="2" dt="2019-01-20T23:12:44.834" idx="35">
+    <p:pos x="7032" y="1128"/>
+    <p:text>CHECKOUT merely is like standing in front of that old copy...or moving the "U R HERE" sticker to that part on the tree</p:text>
+    <p:extLst>
+      <p:ext uri="{C676402C-5697-4E1C-873F-D02D1690AC5C}">
+        <p15:threadingInfo xmlns:p15="http://schemas.microsoft.com/office/powerpoint/2012/main" timeZoneBias="480">
+          <p15:parentCm authorId="2" idx="33"/>
+        </p15:threadingInfo>
+      </p:ext>
+    </p:extLst>
+  </p:cm>
+  <p:cm authorId="2" dt="2019-01-20T23:14:35.703" idx="36">
+    <p:pos x="5064" y="2496"/>
+    <p:text>not so hard to explain with the UR HERE sticker</p:text>
+    <p:extLst>
+      <p:ext uri="{C676402C-5697-4E1C-873F-D02D1690AC5C}">
+        <p15:threadingInfo xmlns:p15="http://schemas.microsoft.com/office/powerpoint/2012/main" timeZoneBias="480"/>
+      </p:ext>
+    </p:extLst>
+  </p:cm>
+  <p:cm authorId="2" dt="2019-01-20T23:16:40.422" idx="37">
+    <p:pos x="6696" y="3168"/>
+    <p:text>going to the newest version on the branch you were on</p:text>
+    <p:extLst>
+      <p:ext uri="{C676402C-5697-4E1C-873F-D02D1690AC5C}">
+        <p15:threadingInfo xmlns:p15="http://schemas.microsoft.com/office/powerpoint/2012/main" timeZoneBias="480"/>
+      </p:ext>
+    </p:extLst>
+  </p:cm>
+  <p:cm authorId="2" dt="2019-01-20T23:17:29.136" idx="38">
+    <p:pos x="2064" y="2688"/>
+    <p:text>with your favored text editor</p:text>
+    <p:extLst>
+      <p:ext uri="{C676402C-5697-4E1C-873F-D02D1690AC5C}">
+        <p15:threadingInfo xmlns:p15="http://schemas.microsoft.com/office/powerpoint/2012/main" timeZoneBias="480"/>
+      </p:ext>
+    </p:extLst>
+  </p:cm>
+</p:cmLst>
+</file>
+
+<file path=ppt/comments/comment13.xml><?xml version="1.0" encoding="utf-8"?>
+<p:cmLst xmlns:a="http://schemas.openxmlformats.org/drawingml/2006/main" xmlns:r="http://schemas.openxmlformats.org/officeDocument/2006/relationships" xmlns:p="http://schemas.openxmlformats.org/presentationml/2006/main">
+  <p:cm authorId="2" dt="2019-01-20T23:22:28.119" idx="39">
+    <p:pos x="2910" y="1920"/>
+    <p:text>the name of a branch is the label for different paths/forks of the tree. if you type the label of the branch, git will automatically assume you mean the tip (or most recent version/commit) in that branch</p:text>
+    <p:extLst>
+      <p:ext uri="{C676402C-5697-4E1C-873F-D02D1690AC5C}">
+        <p15:threadingInfo xmlns:p15="http://schemas.microsoft.com/office/powerpoint/2012/main" timeZoneBias="480"/>
+      </p:ext>
+    </p:extLst>
+  </p:cm>
+  <p:cm authorId="2" dt="2019-01-20T23:23:46.760" idx="40">
+    <p:pos x="7311" y="2732"/>
+    <p:text>this is a bit confusing. are you trying to say "git reset --soft &lt;commit&gt;" changes you to a different spot on the tree, BUT your copy that you're working on doesn't change? I thought that was git checkout...</p:text>
+    <p:extLst>
+      <p:ext uri="{C676402C-5697-4E1C-873F-D02D1690AC5C}">
+        <p15:threadingInfo xmlns:p15="http://schemas.microsoft.com/office/powerpoint/2012/main" timeZoneBias="480"/>
+      </p:ext>
+    </p:extLst>
+  </p:cm>
+</p:cmLst>
+</file>
+
+<file path=ppt/comments/comment14.xml><?xml version="1.0" encoding="utf-8"?>
+<p:cmLst xmlns:a="http://schemas.openxmlformats.org/drawingml/2006/main" xmlns:r="http://schemas.openxmlformats.org/officeDocument/2006/relationships" xmlns:p="http://schemas.openxmlformats.org/presentationml/2006/main">
+  <p:cm authorId="2" dt="2019-01-20T23:42:15.629" idx="41">
+    <p:pos x="1506" y="768"/>
+    <p:text>branch = label for a tree branch</p:text>
+    <p:extLst>
+      <p:ext uri="{C676402C-5697-4E1C-873F-D02D1690AC5C}">
+        <p15:threadingInfo xmlns:p15="http://schemas.microsoft.com/office/powerpoint/2012/main" timeZoneBias="480"/>
+      </p:ext>
+    </p:extLst>
+  </p:cm>
+  <p:cm authorId="2" dt="2019-01-20T23:42:39.382" idx="42">
+    <p:pos x="6676" y="1654"/>
+    <p:text>Where u are sticker</p:text>
+    <p:extLst>
+      <p:ext uri="{C676402C-5697-4E1C-873F-D02D1690AC5C}">
+        <p15:threadingInfo xmlns:p15="http://schemas.microsoft.com/office/powerpoint/2012/main" timeZoneBias="480"/>
+      </p:ext>
+    </p:extLst>
+  </p:cm>
+  <p:cm authorId="2" dt="2019-01-20T23:42:55.236" idx="43">
+    <p:pos x="7060" y="1950"/>
+    <p:text>recall that checkout in git doesn't mean checkout the same way real humans think of it. checkout != borrow a book from the library. instead, it's more like, LOOK AT</p:text>
+    <p:extLst>
+      <p:ext uri="{C676402C-5697-4E1C-873F-D02D1690AC5C}">
+        <p15:threadingInfo xmlns:p15="http://schemas.microsoft.com/office/powerpoint/2012/main" timeZoneBias="480"/>
+      </p:ext>
+    </p:extLst>
+  </p:cm>
+</p:cmLst>
+</file>
+
+<file path=ppt/comments/comment15.xml><?xml version="1.0" encoding="utf-8"?>
+<p:cmLst xmlns:a="http://schemas.openxmlformats.org/drawingml/2006/main" xmlns:r="http://schemas.openxmlformats.org/officeDocument/2006/relationships" xmlns:p="http://schemas.openxmlformats.org/presentationml/2006/main">
+  <p:cm authorId="2" dt="2019-01-20T23:48:14.763" idx="44">
+    <p:pos x="2806" y="1167"/>
+    <p:text>would be good to explain that : its not so nice to do this if you didn't change everything/every file. it makes it harder to visualize when smaller changes were made?</p:text>
+    <p:extLst>
+      <p:ext uri="{C676402C-5697-4E1C-873F-D02D1690AC5C}">
+        <p15:threadingInfo xmlns:p15="http://schemas.microsoft.com/office/powerpoint/2012/main" timeZoneBias="480"/>
+      </p:ext>
+    </p:extLst>
+  </p:cm>
+</p:cmLst>
+</file>
+
+<file path=ppt/comments/comment16.xml><?xml version="1.0" encoding="utf-8"?>
+<p:cmLst xmlns:a="http://schemas.openxmlformats.org/drawingml/2006/main" xmlns:r="http://schemas.openxmlformats.org/officeDocument/2006/relationships" xmlns:p="http://schemas.openxmlformats.org/presentationml/2006/main">
+  <p:cm authorId="2" dt="2019-01-20T23:50:54.440" idx="45">
+    <p:pos x="7089" y="3810"/>
+    <p:text>could be helpful to know a little earlier in the slides?</p:text>
+    <p:extLst>
+      <p:ext uri="{C676402C-5697-4E1C-873F-D02D1690AC5C}">
+        <p15:threadingInfo xmlns:p15="http://schemas.microsoft.com/office/powerpoint/2012/main" timeZoneBias="480"/>
+      </p:ext>
+    </p:extLst>
+  </p:cm>
+</p:cmLst>
+</file>
+
+<file path=ppt/comments/comment17.xml><?xml version="1.0" encoding="utf-8"?>
+<p:cmLst xmlns:a="http://schemas.openxmlformats.org/drawingml/2006/main" xmlns:r="http://schemas.openxmlformats.org/officeDocument/2006/relationships" xmlns:p="http://schemas.openxmlformats.org/presentationml/2006/main">
+  <p:cm authorId="2" dt="2019-01-20T23:51:39.031" idx="46">
+    <p:pos x="6617" y="1447"/>
+    <p:text>would be good to describe what kinds of files.</p:text>
+    <p:extLst>
+      <p:ext uri="{C676402C-5697-4E1C-873F-D02D1690AC5C}">
+        <p15:threadingInfo xmlns:p15="http://schemas.microsoft.com/office/powerpoint/2012/main" timeZoneBias="480"/>
+      </p:ext>
+    </p:extLst>
+  </p:cm>
+  <p:cm authorId="2" dt="2019-01-20T23:52:02.385" idx="47">
+    <p:pos x="6617" y="1543"/>
+    <p:text>for example, files in mac folders that store state of folder icons or whatever</p:text>
+    <p:extLst>
+      <p:ext uri="{C676402C-5697-4E1C-873F-D02D1690AC5C}">
+        <p15:threadingInfo xmlns:p15="http://schemas.microsoft.com/office/powerpoint/2012/main" timeZoneBias="480">
+          <p15:parentCm authorId="2" idx="46"/>
+        </p15:threadingInfo>
+      </p:ext>
+    </p:extLst>
+  </p:cm>
+  <p:cm authorId="2" dt="2019-01-20T23:52:29.754" idx="48">
+    <p:pos x="6617" y="1639"/>
+    <p:text>for ex: if your IDE has a special file that saves the state of the thing that helps you visualize your classes and how they relate to one another (like BlueJ)</p:text>
+    <p:extLst>
+      <p:ext uri="{C676402C-5697-4E1C-873F-D02D1690AC5C}">
+        <p15:threadingInfo xmlns:p15="http://schemas.microsoft.com/office/powerpoint/2012/main" timeZoneBias="480">
+          <p15:parentCm authorId="2" idx="46"/>
+        </p15:threadingInfo>
+      </p:ext>
+    </p:extLst>
+  </p:cm>
+</p:cmLst>
+</file>
+
+<file path=ppt/comments/comment18.xml><?xml version="1.0" encoding="utf-8"?>
+<p:cmLst xmlns:a="http://schemas.openxmlformats.org/drawingml/2006/main" xmlns:r="http://schemas.openxmlformats.org/officeDocument/2006/relationships" xmlns:p="http://schemas.openxmlformats.org/presentationml/2006/main">
+  <p:cm authorId="2" dt="2019-01-20T23:52:47.394" idx="49">
+    <p:pos x="5878" y="458"/>
+    <p:text>huh, why?</p:text>
+    <p:extLst>
+      <p:ext uri="{C676402C-5697-4E1C-873F-D02D1690AC5C}">
+        <p15:threadingInfo xmlns:p15="http://schemas.microsoft.com/office/powerpoint/2012/main" timeZoneBias="480"/>
+      </p:ext>
+    </p:extLst>
+  </p:cm>
+</p:cmLst>
+</file>
+
 <file path=ppt/comments/comment2.xml><?xml version="1.0" encoding="utf-8"?>
+<p:cmLst xmlns:a="http://schemas.openxmlformats.org/drawingml/2006/main" xmlns:r="http://schemas.openxmlformats.org/officeDocument/2006/relationships" xmlns:p="http://schemas.openxmlformats.org/presentationml/2006/main">
+  <p:cm authorId="2" dt="2019-01-20T22:46:46.095" idx="9">
+    <p:pos x="4514" y="1420"/>
+    <p:text>actually...my group found that we can do this. and it was a workaround for not being able to understand how to use the command line with git</p:text>
+    <p:extLst>
+      <p:ext uri="{C676402C-5697-4E1C-873F-D02D1690AC5C}">
+        <p15:threadingInfo xmlns:p15="http://schemas.microsoft.com/office/powerpoint/2012/main" timeZoneBias="480"/>
+      </p:ext>
+    </p:extLst>
+  </p:cm>
+  <p:cm authorId="2" dt="2019-01-20T22:47:25.961" idx="10">
+    <p:pos x="1634" y="3711"/>
+    <p:text>which term is preferred, FETCH or CHECKOUT?</p:text>
+    <p:extLst>
+      <p:ext uri="{C676402C-5697-4E1C-873F-D02D1690AC5C}">
+        <p15:threadingInfo xmlns:p15="http://schemas.microsoft.com/office/powerpoint/2012/main" timeZoneBias="480"/>
+      </p:ext>
+    </p:extLst>
+  </p:cm>
+</p:cmLst>
+</file>
+
+<file path=ppt/comments/comment3.xml><?xml version="1.0" encoding="utf-8"?>
 <p:cmLst xmlns:a="http://schemas.openxmlformats.org/drawingml/2006/main" xmlns:r="http://schemas.openxmlformats.org/officeDocument/2006/relationships" xmlns:p="http://schemas.openxmlformats.org/presentationml/2006/main">
   <p:cm authorId="2" dt="2019-01-14T21:43:54.388" idx="2">
     <p:pos x="2812" y="1416"/>
@@ -354,7 +690,7 @@
 </p:cmLst>
 </file>
 
-<file path=ppt/comments/comment3.xml><?xml version="1.0" encoding="utf-8"?>
+<file path=ppt/comments/comment4.xml><?xml version="1.0" encoding="utf-8"?>
 <p:cmLst xmlns:a="http://schemas.openxmlformats.org/drawingml/2006/main" xmlns:r="http://schemas.openxmlformats.org/officeDocument/2006/relationships" xmlns:p="http://schemas.openxmlformats.org/presentationml/2006/main">
   <p:cm authorId="2" dt="2019-01-14T21:45:39.640" idx="3">
     <p:pos x="5046" y="1728"/>
@@ -377,7 +713,7 @@
 </p:cmLst>
 </file>
 
-<file path=ppt/comments/comment4.xml><?xml version="1.0" encoding="utf-8"?>
+<file path=ppt/comments/comment5.xml><?xml version="1.0" encoding="utf-8"?>
 <p:cmLst xmlns:a="http://schemas.openxmlformats.org/drawingml/2006/main" xmlns:r="http://schemas.openxmlformats.org/officeDocument/2006/relationships" xmlns:p="http://schemas.openxmlformats.org/presentationml/2006/main">
   <p:cm authorId="2" dt="2019-01-14T21:51:03.759" idx="5">
     <p:pos x="6386" y="1640"/>
@@ -402,7 +738,21 @@
 </p:cmLst>
 </file>
 
-<file path=ppt/comments/comment5.xml><?xml version="1.0" encoding="utf-8"?>
+<file path=ppt/comments/comment6.xml><?xml version="1.0" encoding="utf-8"?>
+<p:cmLst xmlns:a="http://schemas.openxmlformats.org/drawingml/2006/main" xmlns:r="http://schemas.openxmlformats.org/officeDocument/2006/relationships" xmlns:p="http://schemas.openxmlformats.org/presentationml/2006/main">
+  <p:cm authorId="2" dt="2019-01-20T22:52:38.098" idx="11">
+    <p:pos x="5728" y="3664"/>
+    <p:text>it's like saying order ready. the chef puts the finished plate on the counter and rings the bell</p:text>
+    <p:extLst>
+      <p:ext uri="{C676402C-5697-4E1C-873F-D02D1690AC5C}">
+        <p15:threadingInfo xmlns:p15="http://schemas.microsoft.com/office/powerpoint/2012/main" timeZoneBias="480"/>
+      </p:ext>
+    </p:extLst>
+  </p:cm>
+</p:cmLst>
+</file>
+
+<file path=ppt/comments/comment7.xml><?xml version="1.0" encoding="utf-8"?>
 <p:cmLst xmlns:a="http://schemas.openxmlformats.org/drawingml/2006/main" xmlns:r="http://schemas.openxmlformats.org/officeDocument/2006/relationships" xmlns:p="http://schemas.openxmlformats.org/presentationml/2006/main">
   <p:cm authorId="2" dt="2019-01-14T22:07:09.193" idx="7">
     <p:pos x="6349" y="1653"/>
@@ -413,14 +763,115 @@
       </p:ext>
     </p:extLst>
   </p:cm>
+  <p:cm authorId="2" dt="2019-01-20T22:54:12.009" idx="13">
+    <p:pos x="6349" y="1749"/>
+    <p:text>git commit -m "this is the comment to add about the version being submitted"</p:text>
+    <p:extLst>
+      <p:ext uri="{C676402C-5697-4E1C-873F-D02D1690AC5C}">
+        <p15:threadingInfo xmlns:p15="http://schemas.microsoft.com/office/powerpoint/2012/main" timeZoneBias="480">
+          <p15:parentCm authorId="2" idx="7"/>
+        </p15:threadingInfo>
+      </p:ext>
+    </p:extLst>
+  </p:cm>
+  <p:cm authorId="2" dt="2019-01-20T22:54:54.079" idx="14">
+    <p:pos x="6349" y="1845"/>
+    <p:text>??</p:text>
+    <p:extLst>
+      <p:ext uri="{C676402C-5697-4E1C-873F-D02D1690AC5C}">
+        <p15:threadingInfo xmlns:p15="http://schemas.microsoft.com/office/powerpoint/2012/main" timeZoneBias="480">
+          <p15:parentCm authorId="2" idx="7"/>
+        </p15:threadingInfo>
+      </p:ext>
+    </p:extLst>
+  </p:cm>
+  <p:cm authorId="2" dt="2019-01-20T22:53:18.489" idx="12">
+    <p:pos x="2080" y="1408"/>
+    <p:text>this is like the restaurant server bringing it to the dining room. the git message is like the server's description of the meal to the diner</p:text>
+    <p:extLst>
+      <p:ext uri="{C676402C-5697-4E1C-873F-D02D1690AC5C}">
+        <p15:threadingInfo xmlns:p15="http://schemas.microsoft.com/office/powerpoint/2012/main" timeZoneBias="480"/>
+      </p:ext>
+    </p:extLst>
+  </p:cm>
 </p:cmLst>
 </file>
 
-<file path=ppt/comments/comment6.xml><?xml version="1.0" encoding="utf-8"?>
+<file path=ppt/comments/comment8.xml><?xml version="1.0" encoding="utf-8"?>
+<p:cmLst xmlns:a="http://schemas.openxmlformats.org/drawingml/2006/main" xmlns:r="http://schemas.openxmlformats.org/officeDocument/2006/relationships" xmlns:p="http://schemas.openxmlformats.org/presentationml/2006/main">
+  <p:cm authorId="2" dt="2019-01-20T22:59:10.197" idx="15">
+    <p:pos x="7008" y="1664"/>
+    <p:text>think of HEAD as WHERE YOU ARE. because there are so many versions, how does your computer/git program keep track of WHERE in ALL the versions you are located? think of it as a "YOU ARE HERE" sticker on a metro or shopping mall map. </p:text>
+    <p:extLst>
+      <p:ext uri="{C676402C-5697-4E1C-873F-D02D1690AC5C}">
+        <p15:threadingInfo xmlns:p15="http://schemas.microsoft.com/office/powerpoint/2012/main" timeZoneBias="480"/>
+      </p:ext>
+    </p:extLst>
+  </p:cm>
+  <p:cm authorId="2" dt="2019-01-20T23:01:32.516" idx="16">
+    <p:pos x="7008" y="1760"/>
+    <p:text>or let's say you're playing a video game, and the game has an option to show you a map of what kingdoms your character has already explored. it will show a little picture of you at the spot where you traveled to. like...you go back a few villages to collect some object or complete some task that you forgot to do. it will show you in that older village.</p:text>
+    <p:extLst>
+      <p:ext uri="{C676402C-5697-4E1C-873F-D02D1690AC5C}">
+        <p15:threadingInfo xmlns:p15="http://schemas.microsoft.com/office/powerpoint/2012/main" timeZoneBias="480">
+          <p15:parentCm authorId="2" idx="15"/>
+        </p15:threadingInfo>
+      </p:ext>
+    </p:extLst>
+  </p:cm>
+  <p:cm authorId="2" dt="2019-01-20T23:01:51.781" idx="17">
+    <p:pos x="7056" y="2544"/>
+    <p:text>git status can also tell you if your version on your computer (your 'working directory') is up to date with the newest version of your branch, or NOT</p:text>
+    <p:extLst>
+      <p:ext uri="{C676402C-5697-4E1C-873F-D02D1690AC5C}">
+        <p15:threadingInfo xmlns:p15="http://schemas.microsoft.com/office/powerpoint/2012/main" timeZoneBias="480"/>
+      </p:ext>
+    </p:extLst>
+  </p:cm>
+</p:cmLst>
+</file>
+
+<file path=ppt/comments/comment9.xml><?xml version="1.0" encoding="utf-8"?>
 <p:cmLst xmlns:a="http://schemas.openxmlformats.org/drawingml/2006/main" xmlns:r="http://schemas.openxmlformats.org/officeDocument/2006/relationships" xmlns:p="http://schemas.openxmlformats.org/presentationml/2006/main">
   <p:cm authorId="2" dt="2019-01-14T22:20:27.256" idx="8">
     <p:pos x="6336" y="1866"/>
     <p:text>HelloWorld.java</p:text>
+    <p:extLst>
+      <p:ext uri="{C676402C-5697-4E1C-873F-D02D1690AC5C}">
+        <p15:threadingInfo xmlns:p15="http://schemas.microsoft.com/office/powerpoint/2012/main" timeZoneBias="480"/>
+      </p:ext>
+    </p:extLst>
+  </p:cm>
+  <p:cm authorId="2" dt="2019-01-20T23:02:56.953" idx="18">
+    <p:pos x="7072" y="1408"/>
+    <p:text>these live on YOUR computer!</p:text>
+    <p:extLst>
+      <p:ext uri="{C676402C-5697-4E1C-873F-D02D1690AC5C}">
+        <p15:threadingInfo xmlns:p15="http://schemas.microsoft.com/office/powerpoint/2012/main" timeZoneBias="480"/>
+      </p:ext>
+    </p:extLst>
+  </p:cm>
+  <p:cm authorId="2" dt="2019-01-20T23:03:40.155" idx="19">
+    <p:pos x="3156" y="2736"/>
+    <p:text>like getting your ducks lined up in a row.</p:text>
+    <p:extLst>
+      <p:ext uri="{C676402C-5697-4E1C-873F-D02D1690AC5C}">
+        <p15:threadingInfo xmlns:p15="http://schemas.microsoft.com/office/powerpoint/2012/main" timeZoneBias="480"/>
+      </p:ext>
+    </p:extLst>
+  </p:cm>
+  <p:cm authorId="2" dt="2019-01-20T23:04:03.044" idx="20">
+    <p:pos x="5520" y="3156"/>
+    <p:text>a new version, all packaged up/ready to go.</p:text>
+    <p:extLst>
+      <p:ext uri="{C676402C-5697-4E1C-873F-D02D1690AC5C}">
+        <p15:threadingInfo xmlns:p15="http://schemas.microsoft.com/office/powerpoint/2012/main" timeZoneBias="480"/>
+      </p:ext>
+    </p:extLst>
+  </p:cm>
+  <p:cm authorId="2" dt="2019-01-20T23:04:26.475" idx="21">
+    <p:pos x="7056" y="3156"/>
+    <p:text>the "YOU ARE HERE" star on the map</p:text>
     <p:extLst>
       <p:ext uri="{C676402C-5697-4E1C-873F-D02D1690AC5C}">
         <p15:threadingInfo xmlns:p15="http://schemas.microsoft.com/office/powerpoint/2012/main" timeZoneBias="480"/>
@@ -577,7 +1028,7 @@
           <a:p>
             <a:fld id="{7FC779F1-FA72-4651-A34E-5CCB109393F6}" type="datetimeFigureOut">
               <a:rPr lang="en-US" smtClean="0"/>
-              <a:t>1/14/19</a:t>
+              <a:t>1/20/19</a:t>
             </a:fld>
             <a:endParaRPr lang="en-US"/>
           </a:p>
@@ -775,7 +1226,7 @@
           <a:p>
             <a:fld id="{7FC779F1-FA72-4651-A34E-5CCB109393F6}" type="datetimeFigureOut">
               <a:rPr lang="en-US" smtClean="0"/>
-              <a:t>1/14/19</a:t>
+              <a:t>1/20/19</a:t>
             </a:fld>
             <a:endParaRPr lang="en-US"/>
           </a:p>
@@ -983,7 +1434,7 @@
           <a:p>
             <a:fld id="{7FC779F1-FA72-4651-A34E-5CCB109393F6}" type="datetimeFigureOut">
               <a:rPr lang="en-US" smtClean="0"/>
-              <a:t>1/14/19</a:t>
+              <a:t>1/20/19</a:t>
             </a:fld>
             <a:endParaRPr lang="en-US"/>
           </a:p>
@@ -1181,7 +1632,7 @@
           <a:p>
             <a:fld id="{7FC779F1-FA72-4651-A34E-5CCB109393F6}" type="datetimeFigureOut">
               <a:rPr lang="en-US" smtClean="0"/>
-              <a:t>1/14/19</a:t>
+              <a:t>1/20/19</a:t>
             </a:fld>
             <a:endParaRPr lang="en-US"/>
           </a:p>
@@ -1456,7 +1907,7 @@
           <a:p>
             <a:fld id="{7FC779F1-FA72-4651-A34E-5CCB109393F6}" type="datetimeFigureOut">
               <a:rPr lang="en-US" smtClean="0"/>
-              <a:t>1/14/19</a:t>
+              <a:t>1/20/19</a:t>
             </a:fld>
             <a:endParaRPr lang="en-US"/>
           </a:p>
@@ -1721,7 +2172,7 @@
           <a:p>
             <a:fld id="{7FC779F1-FA72-4651-A34E-5CCB109393F6}" type="datetimeFigureOut">
               <a:rPr lang="en-US" smtClean="0"/>
-              <a:t>1/14/19</a:t>
+              <a:t>1/20/19</a:t>
             </a:fld>
             <a:endParaRPr lang="en-US"/>
           </a:p>
@@ -2133,7 +2584,7 @@
           <a:p>
             <a:fld id="{7FC779F1-FA72-4651-A34E-5CCB109393F6}" type="datetimeFigureOut">
               <a:rPr lang="en-US" smtClean="0"/>
-              <a:t>1/14/19</a:t>
+              <a:t>1/20/19</a:t>
             </a:fld>
             <a:endParaRPr lang="en-US"/>
           </a:p>
@@ -2274,7 +2725,7 @@
           <a:p>
             <a:fld id="{7FC779F1-FA72-4651-A34E-5CCB109393F6}" type="datetimeFigureOut">
               <a:rPr lang="en-US" smtClean="0"/>
-              <a:t>1/14/19</a:t>
+              <a:t>1/20/19</a:t>
             </a:fld>
             <a:endParaRPr lang="en-US"/>
           </a:p>
@@ -2387,7 +2838,7 @@
           <a:p>
             <a:fld id="{7FC779F1-FA72-4651-A34E-5CCB109393F6}" type="datetimeFigureOut">
               <a:rPr lang="en-US" smtClean="0"/>
-              <a:t>1/14/19</a:t>
+              <a:t>1/20/19</a:t>
             </a:fld>
             <a:endParaRPr lang="en-US"/>
           </a:p>
@@ -2698,7 +3149,7 @@
           <a:p>
             <a:fld id="{7FC779F1-FA72-4651-A34E-5CCB109393F6}" type="datetimeFigureOut">
               <a:rPr lang="en-US" smtClean="0"/>
-              <a:t>1/14/19</a:t>
+              <a:t>1/20/19</a:t>
             </a:fld>
             <a:endParaRPr lang="en-US"/>
           </a:p>
@@ -2986,7 +3437,7 @@
           <a:p>
             <a:fld id="{7FC779F1-FA72-4651-A34E-5CCB109393F6}" type="datetimeFigureOut">
               <a:rPr lang="en-US" smtClean="0"/>
-              <a:t>1/14/19</a:t>
+              <a:t>1/20/19</a:t>
             </a:fld>
             <a:endParaRPr lang="en-US"/>
           </a:p>
@@ -3227,7 +3678,7 @@
           <a:p>
             <a:fld id="{7FC779F1-FA72-4651-A34E-5CCB109393F6}" type="datetimeFigureOut">
               <a:rPr lang="en-US" smtClean="0"/>
-              <a:t>1/14/19</a:t>
+              <a:t>1/20/19</a:t>
             </a:fld>
             <a:endParaRPr lang="en-US"/>
           </a:p>
@@ -3695,6 +4146,23 @@
               </a:rPr>
               <a:t>kim.laine@microsoft.com</a:t>
             </a:r>
+            <a:br>
+              <a:rPr lang="en-US" sz="2000" dirty="0">
+                <a:latin typeface="+mn-lt"/>
+              </a:rPr>
+            </a:br>
+            <a:r>
+              <a:rPr lang="en-US" sz="2000" dirty="0">
+                <a:latin typeface="+mn-lt"/>
+              </a:rPr>
+              <a:t>Megan Laine | </a:t>
+            </a:r>
+            <a:r>
+              <a:rPr lang="en-US" sz="2000" dirty="0" err="1">
+                <a:latin typeface="+mn-lt"/>
+              </a:rPr>
+              <a:t>Funemployed</a:t>
+            </a:r>
             <a:endParaRPr lang="en-US" sz="2000" dirty="0">
               <a:latin typeface="+mn-lt"/>
             </a:endParaRPr>
@@ -9063,7 +9531,7 @@
           <a:p>
             <a:r>
               <a:rPr lang="en-US" dirty="0"/>
-              <a:t>Reset</a:t>
+              <a:t>Reset (SOFT)</a:t>
             </a:r>
           </a:p>
         </p:txBody>
@@ -10540,7 +11008,7 @@
                 <a:latin typeface="Consolas" panose="020B0609020204030204" pitchFamily="49" charset="0"/>
                 <a:hlinkClick r:id="rId2"/>
               </a:rPr>
-              <a:t>https://github.com/&lt;something&gt;/testrepo</a:t>
+              <a:t>https://github.com/&lt;AUserName&gt;/testrepo</a:t>
             </a:r>
             <a:r>
               <a:rPr lang="en-US" dirty="0"/>

</xml_diff>